<commit_message>
modify: database assignment1 mistake
</commit_message>
<xml_diff>
--- a/database_system/assignment1/201921166 정의철 과제1.pptx
+++ b/database_system/assignment1/201921166 정의철 과제1.pptx
@@ -7,28 +7,27 @@
   <p:sldIdLst>
     <p:sldId id="256" r:id="rId2"/>
     <p:sldId id="257" r:id="rId3"/>
-    <p:sldId id="258" r:id="rId4"/>
-    <p:sldId id="259" r:id="rId5"/>
-    <p:sldId id="260" r:id="rId6"/>
-    <p:sldId id="261" r:id="rId7"/>
-    <p:sldId id="262" r:id="rId8"/>
-    <p:sldId id="263" r:id="rId9"/>
-    <p:sldId id="264" r:id="rId10"/>
-    <p:sldId id="265" r:id="rId11"/>
-    <p:sldId id="266" r:id="rId12"/>
-    <p:sldId id="267" r:id="rId13"/>
-    <p:sldId id="268" r:id="rId14"/>
-    <p:sldId id="269" r:id="rId15"/>
-    <p:sldId id="270" r:id="rId16"/>
-    <p:sldId id="271" r:id="rId17"/>
-    <p:sldId id="272" r:id="rId18"/>
-    <p:sldId id="273" r:id="rId19"/>
-    <p:sldId id="274" r:id="rId20"/>
-    <p:sldId id="275" r:id="rId21"/>
-    <p:sldId id="276" r:id="rId22"/>
-    <p:sldId id="277" r:id="rId23"/>
-    <p:sldId id="278" r:id="rId24"/>
-    <p:sldId id="279" r:id="rId25"/>
+    <p:sldId id="280" r:id="rId4"/>
+    <p:sldId id="281" r:id="rId5"/>
+    <p:sldId id="282" r:id="rId6"/>
+    <p:sldId id="259" r:id="rId7"/>
+    <p:sldId id="260" r:id="rId8"/>
+    <p:sldId id="264" r:id="rId9"/>
+    <p:sldId id="265" r:id="rId10"/>
+    <p:sldId id="266" r:id="rId11"/>
+    <p:sldId id="267" r:id="rId12"/>
+    <p:sldId id="268" r:id="rId13"/>
+    <p:sldId id="269" r:id="rId14"/>
+    <p:sldId id="270" r:id="rId15"/>
+    <p:sldId id="271" r:id="rId16"/>
+    <p:sldId id="272" r:id="rId17"/>
+    <p:sldId id="273" r:id="rId18"/>
+    <p:sldId id="274" r:id="rId19"/>
+    <p:sldId id="275" r:id="rId20"/>
+    <p:sldId id="276" r:id="rId21"/>
+    <p:sldId id="277" r:id="rId22"/>
+    <p:sldId id="278" r:id="rId23"/>
+    <p:sldId id="279" r:id="rId24"/>
   </p:sldIdLst>
   <p:sldSz cx="12192000" cy="6858000"/>
   <p:notesSz cx="6858000" cy="9144000"/>
@@ -266,7 +265,7 @@
           <a:p>
             <a:fld id="{1BDC63A1-7CDB-4ACF-B07F-357C9DEB8457}" type="datetimeFigureOut">
               <a:rPr lang="ko-KR" altLang="en-US" smtClean="0"/>
-              <a:t>2021-04-17</a:t>
+              <a:t>2021-04-18</a:t>
             </a:fld>
             <a:endParaRPr lang="ko-KR" altLang="en-US"/>
           </a:p>
@@ -436,7 +435,7 @@
           <a:p>
             <a:fld id="{1BDC63A1-7CDB-4ACF-B07F-357C9DEB8457}" type="datetimeFigureOut">
               <a:rPr lang="ko-KR" altLang="en-US" smtClean="0"/>
-              <a:t>2021-04-17</a:t>
+              <a:t>2021-04-18</a:t>
             </a:fld>
             <a:endParaRPr lang="ko-KR" altLang="en-US"/>
           </a:p>
@@ -616,7 +615,7 @@
           <a:p>
             <a:fld id="{1BDC63A1-7CDB-4ACF-B07F-357C9DEB8457}" type="datetimeFigureOut">
               <a:rPr lang="ko-KR" altLang="en-US" smtClean="0"/>
-              <a:t>2021-04-17</a:t>
+              <a:t>2021-04-18</a:t>
             </a:fld>
             <a:endParaRPr lang="ko-KR" altLang="en-US"/>
           </a:p>
@@ -786,7 +785,7 @@
           <a:p>
             <a:fld id="{1BDC63A1-7CDB-4ACF-B07F-357C9DEB8457}" type="datetimeFigureOut">
               <a:rPr lang="ko-KR" altLang="en-US" smtClean="0"/>
-              <a:t>2021-04-17</a:t>
+              <a:t>2021-04-18</a:t>
             </a:fld>
             <a:endParaRPr lang="ko-KR" altLang="en-US"/>
           </a:p>
@@ -1032,7 +1031,7 @@
           <a:p>
             <a:fld id="{1BDC63A1-7CDB-4ACF-B07F-357C9DEB8457}" type="datetimeFigureOut">
               <a:rPr lang="ko-KR" altLang="en-US" smtClean="0"/>
-              <a:t>2021-04-17</a:t>
+              <a:t>2021-04-18</a:t>
             </a:fld>
             <a:endParaRPr lang="ko-KR" altLang="en-US"/>
           </a:p>
@@ -1264,7 +1263,7 @@
           <a:p>
             <a:fld id="{1BDC63A1-7CDB-4ACF-B07F-357C9DEB8457}" type="datetimeFigureOut">
               <a:rPr lang="ko-KR" altLang="en-US" smtClean="0"/>
-              <a:t>2021-04-17</a:t>
+              <a:t>2021-04-18</a:t>
             </a:fld>
             <a:endParaRPr lang="ko-KR" altLang="en-US"/>
           </a:p>
@@ -1631,7 +1630,7 @@
           <a:p>
             <a:fld id="{1BDC63A1-7CDB-4ACF-B07F-357C9DEB8457}" type="datetimeFigureOut">
               <a:rPr lang="ko-KR" altLang="en-US" smtClean="0"/>
-              <a:t>2021-04-17</a:t>
+              <a:t>2021-04-18</a:t>
             </a:fld>
             <a:endParaRPr lang="ko-KR" altLang="en-US"/>
           </a:p>
@@ -1749,7 +1748,7 @@
           <a:p>
             <a:fld id="{1BDC63A1-7CDB-4ACF-B07F-357C9DEB8457}" type="datetimeFigureOut">
               <a:rPr lang="ko-KR" altLang="en-US" smtClean="0"/>
-              <a:t>2021-04-17</a:t>
+              <a:t>2021-04-18</a:t>
             </a:fld>
             <a:endParaRPr lang="ko-KR" altLang="en-US"/>
           </a:p>
@@ -1844,7 +1843,7 @@
           <a:p>
             <a:fld id="{1BDC63A1-7CDB-4ACF-B07F-357C9DEB8457}" type="datetimeFigureOut">
               <a:rPr lang="ko-KR" altLang="en-US" smtClean="0"/>
-              <a:t>2021-04-17</a:t>
+              <a:t>2021-04-18</a:t>
             </a:fld>
             <a:endParaRPr lang="ko-KR" altLang="en-US"/>
           </a:p>
@@ -2121,7 +2120,7 @@
           <a:p>
             <a:fld id="{1BDC63A1-7CDB-4ACF-B07F-357C9DEB8457}" type="datetimeFigureOut">
               <a:rPr lang="ko-KR" altLang="en-US" smtClean="0"/>
-              <a:t>2021-04-17</a:t>
+              <a:t>2021-04-18</a:t>
             </a:fld>
             <a:endParaRPr lang="ko-KR" altLang="en-US"/>
           </a:p>
@@ -2374,7 +2373,7 @@
           <a:p>
             <a:fld id="{1BDC63A1-7CDB-4ACF-B07F-357C9DEB8457}" type="datetimeFigureOut">
               <a:rPr lang="ko-KR" altLang="en-US" smtClean="0"/>
-              <a:t>2021-04-17</a:t>
+              <a:t>2021-04-18</a:t>
             </a:fld>
             <a:endParaRPr lang="ko-KR" altLang="en-US"/>
           </a:p>
@@ -2587,7 +2586,7 @@
           <a:p>
             <a:fld id="{1BDC63A1-7CDB-4ACF-B07F-357C9DEB8457}" type="datetimeFigureOut">
               <a:rPr lang="ko-KR" altLang="en-US" smtClean="0"/>
-              <a:t>2021-04-17</a:t>
+              <a:t>2021-04-18</a:t>
             </a:fld>
             <a:endParaRPr lang="ko-KR" altLang="en-US"/>
           </a:p>
@@ -3145,7 +3144,7 @@
                 <a:latin typeface="나눔스퀘어_ac" panose="020B0600000101010101" pitchFamily="50" charset="-127"/>
                 <a:ea typeface="나눔스퀘어_ac" panose="020B0600000101010101" pitchFamily="50" charset="-127"/>
               </a:rPr>
-              <a:t>2.7.5.2</a:t>
+              <a:t>2.7.6.1</a:t>
             </a:r>
             <a:endParaRPr lang="ko-KR" altLang="en-US" dirty="0">
               <a:latin typeface="나눔스퀘어_ac" panose="020B0600000101010101" pitchFamily="50" charset="-127"/>
@@ -3157,7 +3156,7 @@
     </p:spTree>
     <p:extLst>
       <p:ext uri="{BB962C8B-B14F-4D97-AF65-F5344CB8AC3E}">
-        <p14:creationId xmlns:p14="http://schemas.microsoft.com/office/powerpoint/2010/main" val="2988552447"/>
+        <p14:creationId xmlns:p14="http://schemas.microsoft.com/office/powerpoint/2010/main" val="1098568617"/>
       </p:ext>
     </p:extLst>
   </p:cSld>
@@ -3241,7 +3240,7 @@
                 <a:latin typeface="나눔스퀘어_ac" panose="020B0600000101010101" pitchFamily="50" charset="-127"/>
                 <a:ea typeface="나눔스퀘어_ac" panose="020B0600000101010101" pitchFamily="50" charset="-127"/>
               </a:rPr>
-              <a:t>2.7.6.1</a:t>
+              <a:t>2.7.6.2</a:t>
             </a:r>
             <a:endParaRPr lang="ko-KR" altLang="en-US" dirty="0">
               <a:latin typeface="나눔스퀘어_ac" panose="020B0600000101010101" pitchFamily="50" charset="-127"/>
@@ -3253,7 +3252,7 @@
     </p:spTree>
     <p:extLst>
       <p:ext uri="{BB962C8B-B14F-4D97-AF65-F5344CB8AC3E}">
-        <p14:creationId xmlns:p14="http://schemas.microsoft.com/office/powerpoint/2010/main" val="1098568617"/>
+        <p14:creationId xmlns:p14="http://schemas.microsoft.com/office/powerpoint/2010/main" val="1802001206"/>
       </p:ext>
     </p:extLst>
   </p:cSld>
@@ -3337,7 +3336,7 @@
                 <a:latin typeface="나눔스퀘어_ac" panose="020B0600000101010101" pitchFamily="50" charset="-127"/>
                 <a:ea typeface="나눔스퀘어_ac" panose="020B0600000101010101" pitchFamily="50" charset="-127"/>
               </a:rPr>
-              <a:t>2.7.6.2</a:t>
+              <a:t>2.7.7.1</a:t>
             </a:r>
             <a:endParaRPr lang="ko-KR" altLang="en-US" dirty="0">
               <a:latin typeface="나눔스퀘어_ac" panose="020B0600000101010101" pitchFamily="50" charset="-127"/>
@@ -3349,7 +3348,7 @@
     </p:spTree>
     <p:extLst>
       <p:ext uri="{BB962C8B-B14F-4D97-AF65-F5344CB8AC3E}">
-        <p14:creationId xmlns:p14="http://schemas.microsoft.com/office/powerpoint/2010/main" val="1802001206"/>
+        <p14:creationId xmlns:p14="http://schemas.microsoft.com/office/powerpoint/2010/main" val="639253269"/>
       </p:ext>
     </p:extLst>
   </p:cSld>
@@ -3433,7 +3432,7 @@
                 <a:latin typeface="나눔스퀘어_ac" panose="020B0600000101010101" pitchFamily="50" charset="-127"/>
                 <a:ea typeface="나눔스퀘어_ac" panose="020B0600000101010101" pitchFamily="50" charset="-127"/>
               </a:rPr>
-              <a:t>2.7.7.1</a:t>
+              <a:t>2.7.7.2</a:t>
             </a:r>
             <a:endParaRPr lang="ko-KR" altLang="en-US" dirty="0">
               <a:latin typeface="나눔스퀘어_ac" panose="020B0600000101010101" pitchFamily="50" charset="-127"/>
@@ -3445,7 +3444,7 @@
     </p:spTree>
     <p:extLst>
       <p:ext uri="{BB962C8B-B14F-4D97-AF65-F5344CB8AC3E}">
-        <p14:creationId xmlns:p14="http://schemas.microsoft.com/office/powerpoint/2010/main" val="639253269"/>
+        <p14:creationId xmlns:p14="http://schemas.microsoft.com/office/powerpoint/2010/main" val="3808281279"/>
       </p:ext>
     </p:extLst>
   </p:cSld>
@@ -3529,7 +3528,7 @@
                 <a:latin typeface="나눔스퀘어_ac" panose="020B0600000101010101" pitchFamily="50" charset="-127"/>
                 <a:ea typeface="나눔스퀘어_ac" panose="020B0600000101010101" pitchFamily="50" charset="-127"/>
               </a:rPr>
-              <a:t>2.7.7.2</a:t>
+              <a:t>2.7.7.3</a:t>
             </a:r>
             <a:endParaRPr lang="ko-KR" altLang="en-US" dirty="0">
               <a:latin typeface="나눔스퀘어_ac" panose="020B0600000101010101" pitchFamily="50" charset="-127"/>
@@ -3541,7 +3540,7 @@
     </p:spTree>
     <p:extLst>
       <p:ext uri="{BB962C8B-B14F-4D97-AF65-F5344CB8AC3E}">
-        <p14:creationId xmlns:p14="http://schemas.microsoft.com/office/powerpoint/2010/main" val="3808281279"/>
+        <p14:creationId xmlns:p14="http://schemas.microsoft.com/office/powerpoint/2010/main" val="2874734178"/>
       </p:ext>
     </p:extLst>
   </p:cSld>
@@ -3607,7 +3606,7 @@
         <p:spPr>
           <a:xfrm>
             <a:off x="10906298" y="5796280"/>
-            <a:ext cx="904415" cy="369332"/>
+            <a:ext cx="710451" cy="369332"/>
           </a:xfrm>
           <a:prstGeom prst="rect">
             <a:avLst/>
@@ -3625,7 +3624,7 @@
                 <a:latin typeface="나눔스퀘어_ac" panose="020B0600000101010101" pitchFamily="50" charset="-127"/>
                 <a:ea typeface="나눔스퀘어_ac" panose="020B0600000101010101" pitchFamily="50" charset="-127"/>
               </a:rPr>
-              <a:t>2.7.7.3</a:t>
+              <a:t>2.7.8</a:t>
             </a:r>
             <a:endParaRPr lang="ko-KR" altLang="en-US" dirty="0">
               <a:latin typeface="나눔스퀘어_ac" panose="020B0600000101010101" pitchFamily="50" charset="-127"/>
@@ -3637,7 +3636,7 @@
     </p:spTree>
     <p:extLst>
       <p:ext uri="{BB962C8B-B14F-4D97-AF65-F5344CB8AC3E}">
-        <p14:creationId xmlns:p14="http://schemas.microsoft.com/office/powerpoint/2010/main" val="2874734178"/>
+        <p14:creationId xmlns:p14="http://schemas.microsoft.com/office/powerpoint/2010/main" val="641133089"/>
       </p:ext>
     </p:extLst>
   </p:cSld>
@@ -3703,7 +3702,7 @@
         <p:spPr>
           <a:xfrm>
             <a:off x="10906298" y="5796280"/>
-            <a:ext cx="710451" cy="369332"/>
+            <a:ext cx="1042273" cy="369332"/>
           </a:xfrm>
           <a:prstGeom prst="rect">
             <a:avLst/>
@@ -3721,7 +3720,7 @@
                 <a:latin typeface="나눔스퀘어_ac" panose="020B0600000101010101" pitchFamily="50" charset="-127"/>
                 <a:ea typeface="나눔스퀘어_ac" panose="020B0600000101010101" pitchFamily="50" charset="-127"/>
               </a:rPr>
-              <a:t>2.7.8</a:t>
+              <a:t>2.7.12.1</a:t>
             </a:r>
             <a:endParaRPr lang="ko-KR" altLang="en-US" dirty="0">
               <a:latin typeface="나눔스퀘어_ac" panose="020B0600000101010101" pitchFamily="50" charset="-127"/>
@@ -3733,7 +3732,7 @@
     </p:spTree>
     <p:extLst>
       <p:ext uri="{BB962C8B-B14F-4D97-AF65-F5344CB8AC3E}">
-        <p14:creationId xmlns:p14="http://schemas.microsoft.com/office/powerpoint/2010/main" val="641133089"/>
+        <p14:creationId xmlns:p14="http://schemas.microsoft.com/office/powerpoint/2010/main" val="3781384818"/>
       </p:ext>
     </p:extLst>
   </p:cSld>
@@ -3817,7 +3816,7 @@
                 <a:latin typeface="나눔스퀘어_ac" panose="020B0600000101010101" pitchFamily="50" charset="-127"/>
                 <a:ea typeface="나눔스퀘어_ac" panose="020B0600000101010101" pitchFamily="50" charset="-127"/>
               </a:rPr>
-              <a:t>2.7.12.1</a:t>
+              <a:t>2.7.12.2</a:t>
             </a:r>
             <a:endParaRPr lang="ko-KR" altLang="en-US" dirty="0">
               <a:latin typeface="나눔스퀘어_ac" panose="020B0600000101010101" pitchFamily="50" charset="-127"/>
@@ -3829,7 +3828,7 @@
     </p:spTree>
     <p:extLst>
       <p:ext uri="{BB962C8B-B14F-4D97-AF65-F5344CB8AC3E}">
-        <p14:creationId xmlns:p14="http://schemas.microsoft.com/office/powerpoint/2010/main" val="3781384818"/>
+        <p14:creationId xmlns:p14="http://schemas.microsoft.com/office/powerpoint/2010/main" val="875419967"/>
       </p:ext>
     </p:extLst>
   </p:cSld>
@@ -3895,7 +3894,7 @@
         <p:spPr>
           <a:xfrm>
             <a:off x="10906298" y="5796280"/>
-            <a:ext cx="1042273" cy="369332"/>
+            <a:ext cx="848309" cy="369332"/>
           </a:xfrm>
           <a:prstGeom prst="rect">
             <a:avLst/>
@@ -3913,7 +3912,7 @@
                 <a:latin typeface="나눔스퀘어_ac" panose="020B0600000101010101" pitchFamily="50" charset="-127"/>
                 <a:ea typeface="나눔스퀘어_ac" panose="020B0600000101010101" pitchFamily="50" charset="-127"/>
               </a:rPr>
-              <a:t>2.7.12.2</a:t>
+              <a:t>2.7.13</a:t>
             </a:r>
             <a:endParaRPr lang="ko-KR" altLang="en-US" dirty="0">
               <a:latin typeface="나눔스퀘어_ac" panose="020B0600000101010101" pitchFamily="50" charset="-127"/>
@@ -3925,7 +3924,7 @@
     </p:spTree>
     <p:extLst>
       <p:ext uri="{BB962C8B-B14F-4D97-AF65-F5344CB8AC3E}">
-        <p14:creationId xmlns:p14="http://schemas.microsoft.com/office/powerpoint/2010/main" val="875419967"/>
+        <p14:creationId xmlns:p14="http://schemas.microsoft.com/office/powerpoint/2010/main" val="1630638826"/>
       </p:ext>
     </p:extLst>
   </p:cSld>
@@ -4009,7 +4008,7 @@
                 <a:latin typeface="나눔스퀘어_ac" panose="020B0600000101010101" pitchFamily="50" charset="-127"/>
                 <a:ea typeface="나눔스퀘어_ac" panose="020B0600000101010101" pitchFamily="50" charset="-127"/>
               </a:rPr>
-              <a:t>2.7.13</a:t>
+              <a:t>2.7.14</a:t>
             </a:r>
             <a:endParaRPr lang="ko-KR" altLang="en-US" dirty="0">
               <a:latin typeface="나눔스퀘어_ac" panose="020B0600000101010101" pitchFamily="50" charset="-127"/>
@@ -4021,7 +4020,7 @@
     </p:spTree>
     <p:extLst>
       <p:ext uri="{BB962C8B-B14F-4D97-AF65-F5344CB8AC3E}">
-        <p14:creationId xmlns:p14="http://schemas.microsoft.com/office/powerpoint/2010/main" val="1630638826"/>
+        <p14:creationId xmlns:p14="http://schemas.microsoft.com/office/powerpoint/2010/main" val="3101002026"/>
       </p:ext>
     </p:extLst>
   </p:cSld>
@@ -4201,7 +4200,7 @@
                 <a:latin typeface="나눔스퀘어_ac" panose="020B0600000101010101" pitchFamily="50" charset="-127"/>
                 <a:ea typeface="나눔스퀘어_ac" panose="020B0600000101010101" pitchFamily="50" charset="-127"/>
               </a:rPr>
-              <a:t>2.7.14</a:t>
+              <a:t>2.7.15</a:t>
             </a:r>
             <a:endParaRPr lang="ko-KR" altLang="en-US" dirty="0">
               <a:latin typeface="나눔스퀘어_ac" panose="020B0600000101010101" pitchFamily="50" charset="-127"/>
@@ -4213,7 +4212,7 @@
     </p:spTree>
     <p:extLst>
       <p:ext uri="{BB962C8B-B14F-4D97-AF65-F5344CB8AC3E}">
-        <p14:creationId xmlns:p14="http://schemas.microsoft.com/office/powerpoint/2010/main" val="3101002026"/>
+        <p14:creationId xmlns:p14="http://schemas.microsoft.com/office/powerpoint/2010/main" val="3841197182"/>
       </p:ext>
     </p:extLst>
   </p:cSld>
@@ -4297,7 +4296,7 @@
                 <a:latin typeface="나눔스퀘어_ac" panose="020B0600000101010101" pitchFamily="50" charset="-127"/>
                 <a:ea typeface="나눔스퀘어_ac" panose="020B0600000101010101" pitchFamily="50" charset="-127"/>
               </a:rPr>
-              <a:t>2.7.15</a:t>
+              <a:t>2.7.16</a:t>
             </a:r>
             <a:endParaRPr lang="ko-KR" altLang="en-US" dirty="0">
               <a:latin typeface="나눔스퀘어_ac" panose="020B0600000101010101" pitchFamily="50" charset="-127"/>
@@ -4309,7 +4308,7 @@
     </p:spTree>
     <p:extLst>
       <p:ext uri="{BB962C8B-B14F-4D97-AF65-F5344CB8AC3E}">
-        <p14:creationId xmlns:p14="http://schemas.microsoft.com/office/powerpoint/2010/main" val="3841197182"/>
+        <p14:creationId xmlns:p14="http://schemas.microsoft.com/office/powerpoint/2010/main" val="1637414980"/>
       </p:ext>
     </p:extLst>
   </p:cSld>
@@ -4393,102 +4392,6 @@
                 <a:latin typeface="나눔스퀘어_ac" panose="020B0600000101010101" pitchFamily="50" charset="-127"/>
                 <a:ea typeface="나눔스퀘어_ac" panose="020B0600000101010101" pitchFamily="50" charset="-127"/>
               </a:rPr>
-              <a:t>2.7.16</a:t>
-            </a:r>
-            <a:endParaRPr lang="ko-KR" altLang="en-US" dirty="0">
-              <a:latin typeface="나눔스퀘어_ac" panose="020B0600000101010101" pitchFamily="50" charset="-127"/>
-              <a:ea typeface="나눔스퀘어_ac" panose="020B0600000101010101" pitchFamily="50" charset="-127"/>
-            </a:endParaRPr>
-          </a:p>
-        </p:txBody>
-      </p:sp>
-    </p:spTree>
-    <p:extLst>
-      <p:ext uri="{BB962C8B-B14F-4D97-AF65-F5344CB8AC3E}">
-        <p14:creationId xmlns:p14="http://schemas.microsoft.com/office/powerpoint/2010/main" val="1637414980"/>
-      </p:ext>
-    </p:extLst>
-  </p:cSld>
-  <p:clrMapOvr>
-    <a:masterClrMapping/>
-  </p:clrMapOvr>
-</p:sld>
-</file>
-
-<file path=ppt/slides/slide23.xml><?xml version="1.0" encoding="utf-8"?>
-<p:sld xmlns:a="http://schemas.openxmlformats.org/drawingml/2006/main" xmlns:r="http://schemas.openxmlformats.org/officeDocument/2006/relationships" xmlns:p="http://schemas.openxmlformats.org/presentationml/2006/main">
-  <p:cSld>
-    <p:spTree>
-      <p:nvGrpSpPr>
-        <p:cNvPr id="1" name=""/>
-        <p:cNvGrpSpPr/>
-        <p:nvPr/>
-      </p:nvGrpSpPr>
-      <p:grpSpPr>
-        <a:xfrm>
-          <a:off x="0" y="0"/>
-          <a:ext cx="0" cy="0"/>
-          <a:chOff x="0" y="0"/>
-          <a:chExt cx="0" cy="0"/>
-        </a:xfrm>
-      </p:grpSpPr>
-      <p:pic>
-        <p:nvPicPr>
-          <p:cNvPr id="2" name="그림 1"/>
-          <p:cNvPicPr>
-            <a:picLocks noChangeAspect="1"/>
-          </p:cNvPicPr>
-          <p:nvPr/>
-        </p:nvPicPr>
-        <p:blipFill>
-          <a:blip r:embed="rId2">
-            <a:extLst>
-              <a:ext uri="{28A0092B-C50C-407E-A947-70E740481C1C}">
-                <a14:useLocalDpi xmlns:a14="http://schemas.microsoft.com/office/drawing/2010/main" val="0"/>
-              </a:ext>
-            </a:extLst>
-          </a:blip>
-          <a:stretch>
-            <a:fillRect/>
-          </a:stretch>
-        </p:blipFill>
-        <p:spPr>
-          <a:xfrm>
-            <a:off x="0" y="127000"/>
-            <a:ext cx="12192000" cy="6604000"/>
-          </a:xfrm>
-          <a:prstGeom prst="rect">
-            <a:avLst/>
-          </a:prstGeom>
-        </p:spPr>
-      </p:pic>
-      <p:sp>
-        <p:nvSpPr>
-          <p:cNvPr id="3" name="TextBox 2"/>
-          <p:cNvSpPr txBox="1"/>
-          <p:nvPr/>
-        </p:nvSpPr>
-        <p:spPr>
-          <a:xfrm>
-            <a:off x="10906298" y="5796280"/>
-            <a:ext cx="848309" cy="369332"/>
-          </a:xfrm>
-          <a:prstGeom prst="rect">
-            <a:avLst/>
-          </a:prstGeom>
-          <a:noFill/>
-        </p:spPr>
-        <p:txBody>
-          <a:bodyPr wrap="none" rtlCol="0">
-            <a:spAutoFit/>
-          </a:bodyPr>
-          <a:lstStyle/>
-          <a:p>
-            <a:r>
-              <a:rPr lang="en-US" altLang="ko-KR" dirty="0" smtClean="0">
-                <a:latin typeface="나눔스퀘어_ac" panose="020B0600000101010101" pitchFamily="50" charset="-127"/>
-                <a:ea typeface="나눔스퀘어_ac" panose="020B0600000101010101" pitchFamily="50" charset="-127"/>
-              </a:rPr>
               <a:t>2.7.17</a:t>
             </a:r>
             <a:endParaRPr lang="ko-KR" altLang="en-US" dirty="0">
@@ -4511,7 +4414,7 @@
 </p:sld>
 </file>
 
-<file path=ppt/slides/slide24.xml><?xml version="1.0" encoding="utf-8"?>
+<file path=ppt/slides/slide23.xml><?xml version="1.0" encoding="utf-8"?>
 <p:sld xmlns:a="http://schemas.openxmlformats.org/drawingml/2006/main" xmlns:r="http://schemas.openxmlformats.org/officeDocument/2006/relationships" xmlns:p="http://schemas.openxmlformats.org/presentationml/2006/main">
   <p:cSld>
     <p:spTree>
@@ -4656,14 +4559,14 @@
       </p:pic>
       <p:sp>
         <p:nvSpPr>
-          <p:cNvPr id="3" name="TextBox 2"/>
+          <p:cNvPr id="6" name="TextBox 5"/>
           <p:cNvSpPr txBox="1"/>
           <p:nvPr/>
         </p:nvSpPr>
         <p:spPr>
           <a:xfrm>
             <a:off x="10906298" y="5796280"/>
-            <a:ext cx="710451" cy="369332"/>
+            <a:ext cx="904415" cy="369332"/>
           </a:xfrm>
           <a:prstGeom prst="rect">
             <a:avLst/>
@@ -4681,7 +4584,7 @@
                 <a:latin typeface="나눔스퀘어_ac" panose="020B0600000101010101" pitchFamily="50" charset="-127"/>
                 <a:ea typeface="나눔스퀘어_ac" panose="020B0600000101010101" pitchFamily="50" charset="-127"/>
               </a:rPr>
-              <a:t>2.6.7</a:t>
+              <a:t>2.5.4.1</a:t>
             </a:r>
             <a:endParaRPr lang="ko-KR" altLang="en-US" dirty="0">
               <a:latin typeface="나눔스퀘어_ac" panose="020B0600000101010101" pitchFamily="50" charset="-127"/>
@@ -4693,7 +4596,7 @@
     </p:spTree>
     <p:extLst>
       <p:ext uri="{BB962C8B-B14F-4D97-AF65-F5344CB8AC3E}">
-        <p14:creationId xmlns:p14="http://schemas.microsoft.com/office/powerpoint/2010/main" val="3840820263"/>
+        <p14:creationId xmlns:p14="http://schemas.microsoft.com/office/powerpoint/2010/main" val="3297130419"/>
       </p:ext>
     </p:extLst>
   </p:cSld>
@@ -4722,7 +4625,7 @@
       </p:grpSpPr>
       <p:pic>
         <p:nvPicPr>
-          <p:cNvPr id="2" name="그림 1"/>
+          <p:cNvPr id="3" name="그림 2"/>
           <p:cNvPicPr>
             <a:picLocks noChangeAspect="1"/>
           </p:cNvPicPr>
@@ -4752,14 +4655,14 @@
       </p:pic>
       <p:sp>
         <p:nvSpPr>
-          <p:cNvPr id="3" name="TextBox 2"/>
+          <p:cNvPr id="6" name="TextBox 5"/>
           <p:cNvSpPr txBox="1"/>
           <p:nvPr/>
         </p:nvSpPr>
         <p:spPr>
           <a:xfrm>
             <a:off x="10906298" y="5796280"/>
-            <a:ext cx="1042273" cy="369332"/>
+            <a:ext cx="904415" cy="369332"/>
           </a:xfrm>
           <a:prstGeom prst="rect">
             <a:avLst/>
@@ -4777,7 +4680,7 @@
                 <a:latin typeface="나눔스퀘어_ac" panose="020B0600000101010101" pitchFamily="50" charset="-127"/>
                 <a:ea typeface="나눔스퀘어_ac" panose="020B0600000101010101" pitchFamily="50" charset="-127"/>
               </a:rPr>
-              <a:t>2.6.12.1</a:t>
+              <a:t>2.5.4.2</a:t>
             </a:r>
             <a:endParaRPr lang="ko-KR" altLang="en-US" dirty="0">
               <a:latin typeface="나눔스퀘어_ac" panose="020B0600000101010101" pitchFamily="50" charset="-127"/>
@@ -4789,7 +4692,7 @@
     </p:spTree>
     <p:extLst>
       <p:ext uri="{BB962C8B-B14F-4D97-AF65-F5344CB8AC3E}">
-        <p14:creationId xmlns:p14="http://schemas.microsoft.com/office/powerpoint/2010/main" val="2838690211"/>
+        <p14:creationId xmlns:p14="http://schemas.microsoft.com/office/powerpoint/2010/main" val="4031249201"/>
       </p:ext>
     </p:extLst>
   </p:cSld>
@@ -4848,14 +4751,14 @@
       </p:pic>
       <p:sp>
         <p:nvSpPr>
-          <p:cNvPr id="3" name="TextBox 2"/>
+          <p:cNvPr id="6" name="TextBox 5"/>
           <p:cNvSpPr txBox="1"/>
           <p:nvPr/>
         </p:nvSpPr>
         <p:spPr>
           <a:xfrm>
             <a:off x="10906298" y="5796280"/>
-            <a:ext cx="1042273" cy="369332"/>
+            <a:ext cx="710451" cy="369332"/>
           </a:xfrm>
           <a:prstGeom prst="rect">
             <a:avLst/>
@@ -4873,7 +4776,7 @@
                 <a:latin typeface="나눔스퀘어_ac" panose="020B0600000101010101" pitchFamily="50" charset="-127"/>
                 <a:ea typeface="나눔스퀘어_ac" panose="020B0600000101010101" pitchFamily="50" charset="-127"/>
               </a:rPr>
-              <a:t>2.6.12.2</a:t>
+              <a:t>2.5.5</a:t>
             </a:r>
             <a:endParaRPr lang="ko-KR" altLang="en-US" dirty="0">
               <a:latin typeface="나눔스퀘어_ac" panose="020B0600000101010101" pitchFamily="50" charset="-127"/>
@@ -4885,7 +4788,7 @@
     </p:spTree>
     <p:extLst>
       <p:ext uri="{BB962C8B-B14F-4D97-AF65-F5344CB8AC3E}">
-        <p14:creationId xmlns:p14="http://schemas.microsoft.com/office/powerpoint/2010/main" val="2406656346"/>
+        <p14:creationId xmlns:p14="http://schemas.microsoft.com/office/powerpoint/2010/main" val="3233746920"/>
       </p:ext>
     </p:extLst>
   </p:cSld>
@@ -4951,7 +4854,7 @@
         <p:spPr>
           <a:xfrm>
             <a:off x="10906298" y="5796280"/>
-            <a:ext cx="848309" cy="369332"/>
+            <a:ext cx="1042273" cy="369332"/>
           </a:xfrm>
           <a:prstGeom prst="rect">
             <a:avLst/>
@@ -4969,7 +4872,7 @@
                 <a:latin typeface="나눔스퀘어_ac" panose="020B0600000101010101" pitchFamily="50" charset="-127"/>
                 <a:ea typeface="나눔스퀘어_ac" panose="020B0600000101010101" pitchFamily="50" charset="-127"/>
               </a:rPr>
-              <a:t>2.6.19</a:t>
+              <a:t>2.6.12.1</a:t>
             </a:r>
             <a:endParaRPr lang="ko-KR" altLang="en-US" dirty="0">
               <a:latin typeface="나눔스퀘어_ac" panose="020B0600000101010101" pitchFamily="50" charset="-127"/>
@@ -4981,7 +4884,7 @@
     </p:spTree>
     <p:extLst>
       <p:ext uri="{BB962C8B-B14F-4D97-AF65-F5344CB8AC3E}">
-        <p14:creationId xmlns:p14="http://schemas.microsoft.com/office/powerpoint/2010/main" val="3203149797"/>
+        <p14:creationId xmlns:p14="http://schemas.microsoft.com/office/powerpoint/2010/main" val="2838690211"/>
       </p:ext>
     </p:extLst>
   </p:cSld>
@@ -5047,7 +4950,7 @@
         <p:spPr>
           <a:xfrm>
             <a:off x="10906298" y="5796280"/>
-            <a:ext cx="848309" cy="369332"/>
+            <a:ext cx="1042273" cy="369332"/>
           </a:xfrm>
           <a:prstGeom prst="rect">
             <a:avLst/>
@@ -5065,7 +4968,7 @@
                 <a:latin typeface="나눔스퀘어_ac" panose="020B0600000101010101" pitchFamily="50" charset="-127"/>
                 <a:ea typeface="나눔스퀘어_ac" panose="020B0600000101010101" pitchFamily="50" charset="-127"/>
               </a:rPr>
-              <a:t>2.6.20</a:t>
+              <a:t>2.6.12.2</a:t>
             </a:r>
             <a:endParaRPr lang="ko-KR" altLang="en-US" dirty="0">
               <a:latin typeface="나눔스퀘어_ac" panose="020B0600000101010101" pitchFamily="50" charset="-127"/>
@@ -5077,7 +4980,7 @@
     </p:spTree>
     <p:extLst>
       <p:ext uri="{BB962C8B-B14F-4D97-AF65-F5344CB8AC3E}">
-        <p14:creationId xmlns:p14="http://schemas.microsoft.com/office/powerpoint/2010/main" val="481195494"/>
+        <p14:creationId xmlns:p14="http://schemas.microsoft.com/office/powerpoint/2010/main" val="2406656346"/>
       </p:ext>
     </p:extLst>
   </p:cSld>
@@ -5143,7 +5046,7 @@
         <p:spPr>
           <a:xfrm>
             <a:off x="10906298" y="5796280"/>
-            <a:ext cx="848309" cy="369332"/>
+            <a:ext cx="904415" cy="369332"/>
           </a:xfrm>
           <a:prstGeom prst="rect">
             <a:avLst/>
@@ -5161,7 +5064,7 @@
                 <a:latin typeface="나눔스퀘어_ac" panose="020B0600000101010101" pitchFamily="50" charset="-127"/>
                 <a:ea typeface="나눔스퀘어_ac" panose="020B0600000101010101" pitchFamily="50" charset="-127"/>
               </a:rPr>
-              <a:t>2.6.21</a:t>
+              <a:t>2.7.5.1</a:t>
             </a:r>
             <a:endParaRPr lang="ko-KR" altLang="en-US" dirty="0">
               <a:latin typeface="나눔스퀘어_ac" panose="020B0600000101010101" pitchFamily="50" charset="-127"/>
@@ -5173,7 +5076,7 @@
     </p:spTree>
     <p:extLst>
       <p:ext uri="{BB962C8B-B14F-4D97-AF65-F5344CB8AC3E}">
-        <p14:creationId xmlns:p14="http://schemas.microsoft.com/office/powerpoint/2010/main" val="26161686"/>
+        <p14:creationId xmlns:p14="http://schemas.microsoft.com/office/powerpoint/2010/main" val="3038828578"/>
       </p:ext>
     </p:extLst>
   </p:cSld>
@@ -5257,7 +5160,7 @@
                 <a:latin typeface="나눔스퀘어_ac" panose="020B0600000101010101" pitchFamily="50" charset="-127"/>
                 <a:ea typeface="나눔스퀘어_ac" panose="020B0600000101010101" pitchFamily="50" charset="-127"/>
               </a:rPr>
-              <a:t>2.7.5.1</a:t>
+              <a:t>2.7.5.2</a:t>
             </a:r>
             <a:endParaRPr lang="ko-KR" altLang="en-US" dirty="0">
               <a:latin typeface="나눔스퀘어_ac" panose="020B0600000101010101" pitchFamily="50" charset="-127"/>
@@ -5269,7 +5172,7 @@
     </p:spTree>
     <p:extLst>
       <p:ext uri="{BB962C8B-B14F-4D97-AF65-F5344CB8AC3E}">
-        <p14:creationId xmlns:p14="http://schemas.microsoft.com/office/powerpoint/2010/main" val="3038828578"/>
+        <p14:creationId xmlns:p14="http://schemas.microsoft.com/office/powerpoint/2010/main" val="2988552447"/>
       </p:ext>
     </p:extLst>
   </p:cSld>

</xml_diff>